<commit_message>
uml: Carify that the arrowhead denotes navigability
</commit_message>
<xml_diff>
--- a/diagrams/uml/classDiagrams/associations/navigability/logicMinefield.pptx
+++ b/diagrams/uml/classDiagrams/associations/navigability/logicMinefield.pptx
@@ -104,6 +104,22 @@
       </a:defRPr>
     </a:lvl9pPr>
   </p:defaultTextStyle>
+  <p:extLst>
+    <p:ext uri="{EFAFB233-063F-42B5-8137-9DF3F51BA10A}">
+      <p15:sldGuideLst xmlns:p15="http://schemas.microsoft.com/office/powerpoint/2012/main">
+        <p15:guide id="1" orient="horz" pos="2160">
+          <p15:clr>
+            <a:srgbClr val="A4A3A4"/>
+          </p15:clr>
+        </p15:guide>
+        <p15:guide id="2" pos="2880">
+          <p15:clr>
+            <a:srgbClr val="A4A3A4"/>
+          </p15:clr>
+        </p15:guide>
+      </p15:sldGuideLst>
+    </p:ext>
+  </p:extLst>
 </p:presentation>
 </file>
 
@@ -145,7 +161,7 @@
           <a:lstStyle/>
           <a:p>
             <a:r>
-              <a:rPr lang="en-US" smtClean="0"/>
+              <a:rPr lang="en-US"/>
               <a:t>Click to edit Master title style</a:t>
             </a:r>
             <a:endParaRPr lang="en-SG"/>
@@ -264,7 +280,7 @@
           </a:lstStyle>
           <a:p>
             <a:r>
-              <a:rPr lang="en-US" smtClean="0"/>
+              <a:rPr lang="en-US"/>
               <a:t>Click to edit Master subtitle style</a:t>
             </a:r>
             <a:endParaRPr lang="en-SG"/>
@@ -288,7 +304,7 @@
           <a:p>
             <a:fld id="{A0F86979-30DA-49EE-A740-32EBA6D2B7DE}" type="datetimeFigureOut">
               <a:rPr lang="en-SG" smtClean="0"/>
-              <a:t>2/6/2017</a:t>
+              <a:t>28/7/2024</a:t>
             </a:fld>
             <a:endParaRPr lang="en-SG"/>
           </a:p>
@@ -382,7 +398,7 @@
           <a:lstStyle/>
           <a:p>
             <a:r>
-              <a:rPr lang="en-US" smtClean="0"/>
+              <a:rPr lang="en-US"/>
               <a:t>Click to edit Master title style</a:t>
             </a:r>
             <a:endParaRPr lang="en-SG"/>
@@ -406,35 +422,35 @@
           <a:p>
             <a:pPr lvl="0"/>
             <a:r>
-              <a:rPr lang="en-US" smtClean="0"/>
+              <a:rPr lang="en-US"/>
               <a:t>Click to edit Master text styles</a:t>
             </a:r>
           </a:p>
           <a:p>
             <a:pPr lvl="1"/>
             <a:r>
-              <a:rPr lang="en-US" smtClean="0"/>
+              <a:rPr lang="en-US"/>
               <a:t>Second level</a:t>
             </a:r>
           </a:p>
           <a:p>
             <a:pPr lvl="2"/>
             <a:r>
-              <a:rPr lang="en-US" smtClean="0"/>
+              <a:rPr lang="en-US"/>
               <a:t>Third level</a:t>
             </a:r>
           </a:p>
           <a:p>
             <a:pPr lvl="3"/>
             <a:r>
-              <a:rPr lang="en-US" smtClean="0"/>
+              <a:rPr lang="en-US"/>
               <a:t>Fourth level</a:t>
             </a:r>
           </a:p>
           <a:p>
             <a:pPr lvl="4"/>
             <a:r>
-              <a:rPr lang="en-US" smtClean="0"/>
+              <a:rPr lang="en-US"/>
               <a:t>Fifth level</a:t>
             </a:r>
             <a:endParaRPr lang="en-SG"/>
@@ -458,7 +474,7 @@
           <a:p>
             <a:fld id="{A0F86979-30DA-49EE-A740-32EBA6D2B7DE}" type="datetimeFigureOut">
               <a:rPr lang="en-SG" smtClean="0"/>
-              <a:t>2/6/2017</a:t>
+              <a:t>28/7/2024</a:t>
             </a:fld>
             <a:endParaRPr lang="en-SG"/>
           </a:p>
@@ -557,7 +573,7 @@
           <a:lstStyle/>
           <a:p>
             <a:r>
-              <a:rPr lang="en-US" smtClean="0"/>
+              <a:rPr lang="en-US"/>
               <a:t>Click to edit Master title style</a:t>
             </a:r>
             <a:endParaRPr lang="en-SG"/>
@@ -586,35 +602,35 @@
           <a:p>
             <a:pPr lvl="0"/>
             <a:r>
-              <a:rPr lang="en-US" smtClean="0"/>
+              <a:rPr lang="en-US"/>
               <a:t>Click to edit Master text styles</a:t>
             </a:r>
           </a:p>
           <a:p>
             <a:pPr lvl="1"/>
             <a:r>
-              <a:rPr lang="en-US" smtClean="0"/>
+              <a:rPr lang="en-US"/>
               <a:t>Second level</a:t>
             </a:r>
           </a:p>
           <a:p>
             <a:pPr lvl="2"/>
             <a:r>
-              <a:rPr lang="en-US" smtClean="0"/>
+              <a:rPr lang="en-US"/>
               <a:t>Third level</a:t>
             </a:r>
           </a:p>
           <a:p>
             <a:pPr lvl="3"/>
             <a:r>
-              <a:rPr lang="en-US" smtClean="0"/>
+              <a:rPr lang="en-US"/>
               <a:t>Fourth level</a:t>
             </a:r>
           </a:p>
           <a:p>
             <a:pPr lvl="4"/>
             <a:r>
-              <a:rPr lang="en-US" smtClean="0"/>
+              <a:rPr lang="en-US"/>
               <a:t>Fifth level</a:t>
             </a:r>
             <a:endParaRPr lang="en-SG"/>
@@ -638,7 +654,7 @@
           <a:p>
             <a:fld id="{A0F86979-30DA-49EE-A740-32EBA6D2B7DE}" type="datetimeFigureOut">
               <a:rPr lang="en-SG" smtClean="0"/>
-              <a:t>2/6/2017</a:t>
+              <a:t>28/7/2024</a:t>
             </a:fld>
             <a:endParaRPr lang="en-SG"/>
           </a:p>
@@ -732,7 +748,7 @@
           <a:lstStyle/>
           <a:p>
             <a:r>
-              <a:rPr lang="en-US" smtClean="0"/>
+              <a:rPr lang="en-US"/>
               <a:t>Click to edit Master title style</a:t>
             </a:r>
             <a:endParaRPr lang="en-SG"/>
@@ -756,35 +772,35 @@
           <a:p>
             <a:pPr lvl="0"/>
             <a:r>
-              <a:rPr lang="en-US" smtClean="0"/>
+              <a:rPr lang="en-US"/>
               <a:t>Click to edit Master text styles</a:t>
             </a:r>
           </a:p>
           <a:p>
             <a:pPr lvl="1"/>
             <a:r>
-              <a:rPr lang="en-US" smtClean="0"/>
+              <a:rPr lang="en-US"/>
               <a:t>Second level</a:t>
             </a:r>
           </a:p>
           <a:p>
             <a:pPr lvl="2"/>
             <a:r>
-              <a:rPr lang="en-US" smtClean="0"/>
+              <a:rPr lang="en-US"/>
               <a:t>Third level</a:t>
             </a:r>
           </a:p>
           <a:p>
             <a:pPr lvl="3"/>
             <a:r>
-              <a:rPr lang="en-US" smtClean="0"/>
+              <a:rPr lang="en-US"/>
               <a:t>Fourth level</a:t>
             </a:r>
           </a:p>
           <a:p>
             <a:pPr lvl="4"/>
             <a:r>
-              <a:rPr lang="en-US" smtClean="0"/>
+              <a:rPr lang="en-US"/>
               <a:t>Fifth level</a:t>
             </a:r>
             <a:endParaRPr lang="en-SG"/>
@@ -808,7 +824,7 @@
           <a:p>
             <a:fld id="{A0F86979-30DA-49EE-A740-32EBA6D2B7DE}" type="datetimeFigureOut">
               <a:rPr lang="en-SG" smtClean="0"/>
-              <a:t>2/6/2017</a:t>
+              <a:t>28/7/2024</a:t>
             </a:fld>
             <a:endParaRPr lang="en-SG"/>
           </a:p>
@@ -911,7 +927,7 @@
           </a:lstStyle>
           <a:p>
             <a:r>
-              <a:rPr lang="en-US" smtClean="0"/>
+              <a:rPr lang="en-US"/>
               <a:t>Click to edit Master title style</a:t>
             </a:r>
             <a:endParaRPr lang="en-SG"/>
@@ -1031,7 +1047,7 @@
           <a:p>
             <a:pPr lvl="0"/>
             <a:r>
-              <a:rPr lang="en-US" smtClean="0"/>
+              <a:rPr lang="en-US"/>
               <a:t>Click to edit Master text styles</a:t>
             </a:r>
           </a:p>
@@ -1054,7 +1070,7 @@
           <a:p>
             <a:fld id="{A0F86979-30DA-49EE-A740-32EBA6D2B7DE}" type="datetimeFigureOut">
               <a:rPr lang="en-SG" smtClean="0"/>
-              <a:t>2/6/2017</a:t>
+              <a:t>28/7/2024</a:t>
             </a:fld>
             <a:endParaRPr lang="en-SG"/>
           </a:p>
@@ -1148,7 +1164,7 @@
           <a:lstStyle/>
           <a:p>
             <a:r>
-              <a:rPr lang="en-US" smtClean="0"/>
+              <a:rPr lang="en-US"/>
               <a:t>Click to edit Master title style</a:t>
             </a:r>
             <a:endParaRPr lang="en-SG"/>
@@ -1205,35 +1221,35 @@
           <a:p>
             <a:pPr lvl="0"/>
             <a:r>
-              <a:rPr lang="en-US" smtClean="0"/>
+              <a:rPr lang="en-US"/>
               <a:t>Click to edit Master text styles</a:t>
             </a:r>
           </a:p>
           <a:p>
             <a:pPr lvl="1"/>
             <a:r>
-              <a:rPr lang="en-US" smtClean="0"/>
+              <a:rPr lang="en-US"/>
               <a:t>Second level</a:t>
             </a:r>
           </a:p>
           <a:p>
             <a:pPr lvl="2"/>
             <a:r>
-              <a:rPr lang="en-US" smtClean="0"/>
+              <a:rPr lang="en-US"/>
               <a:t>Third level</a:t>
             </a:r>
           </a:p>
           <a:p>
             <a:pPr lvl="3"/>
             <a:r>
-              <a:rPr lang="en-US" smtClean="0"/>
+              <a:rPr lang="en-US"/>
               <a:t>Fourth level</a:t>
             </a:r>
           </a:p>
           <a:p>
             <a:pPr lvl="4"/>
             <a:r>
-              <a:rPr lang="en-US" smtClean="0"/>
+              <a:rPr lang="en-US"/>
               <a:t>Fifth level</a:t>
             </a:r>
             <a:endParaRPr lang="en-SG"/>
@@ -1290,35 +1306,35 @@
           <a:p>
             <a:pPr lvl="0"/>
             <a:r>
-              <a:rPr lang="en-US" smtClean="0"/>
+              <a:rPr lang="en-US"/>
               <a:t>Click to edit Master text styles</a:t>
             </a:r>
           </a:p>
           <a:p>
             <a:pPr lvl="1"/>
             <a:r>
-              <a:rPr lang="en-US" smtClean="0"/>
+              <a:rPr lang="en-US"/>
               <a:t>Second level</a:t>
             </a:r>
           </a:p>
           <a:p>
             <a:pPr lvl="2"/>
             <a:r>
-              <a:rPr lang="en-US" smtClean="0"/>
+              <a:rPr lang="en-US"/>
               <a:t>Third level</a:t>
             </a:r>
           </a:p>
           <a:p>
             <a:pPr lvl="3"/>
             <a:r>
-              <a:rPr lang="en-US" smtClean="0"/>
+              <a:rPr lang="en-US"/>
               <a:t>Fourth level</a:t>
             </a:r>
           </a:p>
           <a:p>
             <a:pPr lvl="4"/>
             <a:r>
-              <a:rPr lang="en-US" smtClean="0"/>
+              <a:rPr lang="en-US"/>
               <a:t>Fifth level</a:t>
             </a:r>
             <a:endParaRPr lang="en-SG"/>
@@ -1342,7 +1358,7 @@
           <a:p>
             <a:fld id="{A0F86979-30DA-49EE-A740-32EBA6D2B7DE}" type="datetimeFigureOut">
               <a:rPr lang="en-SG" smtClean="0"/>
-              <a:t>2/6/2017</a:t>
+              <a:t>28/7/2024</a:t>
             </a:fld>
             <a:endParaRPr lang="en-SG"/>
           </a:p>
@@ -1440,7 +1456,7 @@
           </a:lstStyle>
           <a:p>
             <a:r>
-              <a:rPr lang="en-US" smtClean="0"/>
+              <a:rPr lang="en-US"/>
               <a:t>Click to edit Master title style</a:t>
             </a:r>
             <a:endParaRPr lang="en-SG"/>
@@ -1506,7 +1522,7 @@
           <a:p>
             <a:pPr lvl="0"/>
             <a:r>
-              <a:rPr lang="en-US" smtClean="0"/>
+              <a:rPr lang="en-US"/>
               <a:t>Click to edit Master text styles</a:t>
             </a:r>
           </a:p>
@@ -1562,35 +1578,35 @@
           <a:p>
             <a:pPr lvl="0"/>
             <a:r>
-              <a:rPr lang="en-US" smtClean="0"/>
+              <a:rPr lang="en-US"/>
               <a:t>Click to edit Master text styles</a:t>
             </a:r>
           </a:p>
           <a:p>
             <a:pPr lvl="1"/>
             <a:r>
-              <a:rPr lang="en-US" smtClean="0"/>
+              <a:rPr lang="en-US"/>
               <a:t>Second level</a:t>
             </a:r>
           </a:p>
           <a:p>
             <a:pPr lvl="2"/>
             <a:r>
-              <a:rPr lang="en-US" smtClean="0"/>
+              <a:rPr lang="en-US"/>
               <a:t>Third level</a:t>
             </a:r>
           </a:p>
           <a:p>
             <a:pPr lvl="3"/>
             <a:r>
-              <a:rPr lang="en-US" smtClean="0"/>
+              <a:rPr lang="en-US"/>
               <a:t>Fourth level</a:t>
             </a:r>
           </a:p>
           <a:p>
             <a:pPr lvl="4"/>
             <a:r>
-              <a:rPr lang="en-US" smtClean="0"/>
+              <a:rPr lang="en-US"/>
               <a:t>Fifth level</a:t>
             </a:r>
             <a:endParaRPr lang="en-SG"/>
@@ -1656,7 +1672,7 @@
           <a:p>
             <a:pPr lvl="0"/>
             <a:r>
-              <a:rPr lang="en-US" smtClean="0"/>
+              <a:rPr lang="en-US"/>
               <a:t>Click to edit Master text styles</a:t>
             </a:r>
           </a:p>
@@ -1712,35 +1728,35 @@
           <a:p>
             <a:pPr lvl="0"/>
             <a:r>
-              <a:rPr lang="en-US" smtClean="0"/>
+              <a:rPr lang="en-US"/>
               <a:t>Click to edit Master text styles</a:t>
             </a:r>
           </a:p>
           <a:p>
             <a:pPr lvl="1"/>
             <a:r>
-              <a:rPr lang="en-US" smtClean="0"/>
+              <a:rPr lang="en-US"/>
               <a:t>Second level</a:t>
             </a:r>
           </a:p>
           <a:p>
             <a:pPr lvl="2"/>
             <a:r>
-              <a:rPr lang="en-US" smtClean="0"/>
+              <a:rPr lang="en-US"/>
               <a:t>Third level</a:t>
             </a:r>
           </a:p>
           <a:p>
             <a:pPr lvl="3"/>
             <a:r>
-              <a:rPr lang="en-US" smtClean="0"/>
+              <a:rPr lang="en-US"/>
               <a:t>Fourth level</a:t>
             </a:r>
           </a:p>
           <a:p>
             <a:pPr lvl="4"/>
             <a:r>
-              <a:rPr lang="en-US" smtClean="0"/>
+              <a:rPr lang="en-US"/>
               <a:t>Fifth level</a:t>
             </a:r>
             <a:endParaRPr lang="en-SG"/>
@@ -1764,7 +1780,7 @@
           <a:p>
             <a:fld id="{A0F86979-30DA-49EE-A740-32EBA6D2B7DE}" type="datetimeFigureOut">
               <a:rPr lang="en-SG" smtClean="0"/>
-              <a:t>2/6/2017</a:t>
+              <a:t>28/7/2024</a:t>
             </a:fld>
             <a:endParaRPr lang="en-SG"/>
           </a:p>
@@ -1858,7 +1874,7 @@
           <a:lstStyle/>
           <a:p>
             <a:r>
-              <a:rPr lang="en-US" smtClean="0"/>
+              <a:rPr lang="en-US"/>
               <a:t>Click to edit Master title style</a:t>
             </a:r>
             <a:endParaRPr lang="en-SG"/>
@@ -1882,7 +1898,7 @@
           <a:p>
             <a:fld id="{A0F86979-30DA-49EE-A740-32EBA6D2B7DE}" type="datetimeFigureOut">
               <a:rPr lang="en-SG" smtClean="0"/>
-              <a:t>2/6/2017</a:t>
+              <a:t>28/7/2024</a:t>
             </a:fld>
             <a:endParaRPr lang="en-SG"/>
           </a:p>
@@ -1977,7 +1993,7 @@
           <a:p>
             <a:fld id="{A0F86979-30DA-49EE-A740-32EBA6D2B7DE}" type="datetimeFigureOut">
               <a:rPr lang="en-SG" smtClean="0"/>
-              <a:t>2/6/2017</a:t>
+              <a:t>28/7/2024</a:t>
             </a:fld>
             <a:endParaRPr lang="en-SG"/>
           </a:p>
@@ -2080,7 +2096,7 @@
           </a:lstStyle>
           <a:p>
             <a:r>
-              <a:rPr lang="en-US" smtClean="0"/>
+              <a:rPr lang="en-US"/>
               <a:t>Click to edit Master title style</a:t>
             </a:r>
             <a:endParaRPr lang="en-SG"/>
@@ -2137,35 +2153,35 @@
           <a:p>
             <a:pPr lvl="0"/>
             <a:r>
-              <a:rPr lang="en-US" smtClean="0"/>
+              <a:rPr lang="en-US"/>
               <a:t>Click to edit Master text styles</a:t>
             </a:r>
           </a:p>
           <a:p>
             <a:pPr lvl="1"/>
             <a:r>
-              <a:rPr lang="en-US" smtClean="0"/>
+              <a:rPr lang="en-US"/>
               <a:t>Second level</a:t>
             </a:r>
           </a:p>
           <a:p>
             <a:pPr lvl="2"/>
             <a:r>
-              <a:rPr lang="en-US" smtClean="0"/>
+              <a:rPr lang="en-US"/>
               <a:t>Third level</a:t>
             </a:r>
           </a:p>
           <a:p>
             <a:pPr lvl="3"/>
             <a:r>
-              <a:rPr lang="en-US" smtClean="0"/>
+              <a:rPr lang="en-US"/>
               <a:t>Fourth level</a:t>
             </a:r>
           </a:p>
           <a:p>
             <a:pPr lvl="4"/>
             <a:r>
-              <a:rPr lang="en-US" smtClean="0"/>
+              <a:rPr lang="en-US"/>
               <a:t>Fifth level</a:t>
             </a:r>
             <a:endParaRPr lang="en-SG"/>
@@ -2231,7 +2247,7 @@
           <a:p>
             <a:pPr lvl="0"/>
             <a:r>
-              <a:rPr lang="en-US" smtClean="0"/>
+              <a:rPr lang="en-US"/>
               <a:t>Click to edit Master text styles</a:t>
             </a:r>
           </a:p>
@@ -2254,7 +2270,7 @@
           <a:p>
             <a:fld id="{A0F86979-30DA-49EE-A740-32EBA6D2B7DE}" type="datetimeFigureOut">
               <a:rPr lang="en-SG" smtClean="0"/>
-              <a:t>2/6/2017</a:t>
+              <a:t>28/7/2024</a:t>
             </a:fld>
             <a:endParaRPr lang="en-SG"/>
           </a:p>
@@ -2357,7 +2373,7 @@
           </a:lstStyle>
           <a:p>
             <a:r>
-              <a:rPr lang="en-US" smtClean="0"/>
+              <a:rPr lang="en-US"/>
               <a:t>Click to edit Master title style</a:t>
             </a:r>
             <a:endParaRPr lang="en-SG"/>
@@ -2484,7 +2500,7 @@
           <a:p>
             <a:pPr lvl="0"/>
             <a:r>
-              <a:rPr lang="en-US" smtClean="0"/>
+              <a:rPr lang="en-US"/>
               <a:t>Click to edit Master text styles</a:t>
             </a:r>
           </a:p>
@@ -2507,7 +2523,7 @@
           <a:p>
             <a:fld id="{A0F86979-30DA-49EE-A740-32EBA6D2B7DE}" type="datetimeFigureOut">
               <a:rPr lang="en-SG" smtClean="0"/>
-              <a:t>2/6/2017</a:t>
+              <a:t>28/7/2024</a:t>
             </a:fld>
             <a:endParaRPr lang="en-SG"/>
           </a:p>
@@ -2616,7 +2632,7 @@
           <a:lstStyle/>
           <a:p>
             <a:r>
-              <a:rPr lang="en-US" smtClean="0"/>
+              <a:rPr lang="en-US"/>
               <a:t>Click to edit Master title style</a:t>
             </a:r>
             <a:endParaRPr lang="en-SG"/>
@@ -2650,35 +2666,35 @@
           <a:p>
             <a:pPr lvl="0"/>
             <a:r>
-              <a:rPr lang="en-US" smtClean="0"/>
+              <a:rPr lang="en-US"/>
               <a:t>Click to edit Master text styles</a:t>
             </a:r>
           </a:p>
           <a:p>
             <a:pPr lvl="1"/>
             <a:r>
-              <a:rPr lang="en-US" smtClean="0"/>
+              <a:rPr lang="en-US"/>
               <a:t>Second level</a:t>
             </a:r>
           </a:p>
           <a:p>
             <a:pPr lvl="2"/>
             <a:r>
-              <a:rPr lang="en-US" smtClean="0"/>
+              <a:rPr lang="en-US"/>
               <a:t>Third level</a:t>
             </a:r>
           </a:p>
           <a:p>
             <a:pPr lvl="3"/>
             <a:r>
-              <a:rPr lang="en-US" smtClean="0"/>
+              <a:rPr lang="en-US"/>
               <a:t>Fourth level</a:t>
             </a:r>
           </a:p>
           <a:p>
             <a:pPr lvl="4"/>
             <a:r>
-              <a:rPr lang="en-US" smtClean="0"/>
+              <a:rPr lang="en-US"/>
               <a:t>Fifth level</a:t>
             </a:r>
             <a:endParaRPr lang="en-SG"/>
@@ -2720,7 +2736,7 @@
           <a:p>
             <a:fld id="{A0F86979-30DA-49EE-A740-32EBA6D2B7DE}" type="datetimeFigureOut">
               <a:rPr lang="en-SG" smtClean="0"/>
-              <a:t>2/6/2017</a:t>
+              <a:t>28/7/2024</a:t>
             </a:fld>
             <a:endParaRPr lang="en-SG"/>
           </a:p>
@@ -3149,7 +3165,7 @@
               <a:defRPr/>
             </a:pPr>
             <a:r>
-              <a:rPr lang="en-US" sz="2200" kern="0" noProof="0" dirty="0" smtClean="0">
+              <a:rPr lang="en-US" sz="2200" kern="0" noProof="0" dirty="0">
                 <a:solidFill>
                   <a:sysClr val="windowText" lastClr="000000"/>
                 </a:solidFill>
@@ -3157,7 +3173,7 @@
               </a:rPr>
               <a:t>Logic</a:t>
             </a:r>
-            <a:endParaRPr kumimoji="0" lang="en-US" sz="2200" i="0" u="none" strike="noStrike" kern="0" cap="none" spc="0" normalizeH="0" baseline="0" noProof="0" dirty="0" smtClean="0">
+            <a:endParaRPr kumimoji="0" lang="en-US" sz="2200" i="0" u="none" strike="noStrike" kern="0" cap="none" spc="0" normalizeH="0" baseline="0" noProof="0" dirty="0">
               <a:ln>
                 <a:noFill/>
               </a:ln>
@@ -3226,7 +3242,7 @@
               <a:defRPr/>
             </a:pPr>
             <a:r>
-              <a:rPr kumimoji="0" lang="en-US" sz="2200" b="0" i="0" u="none" strike="noStrike" kern="0" cap="none" spc="0" normalizeH="0" baseline="0" noProof="0" dirty="0" smtClean="0">
+              <a:rPr kumimoji="0" lang="en-US" sz="2200" b="0" i="0" u="none" strike="noStrike" kern="0" cap="none" spc="0" normalizeH="0" baseline="0" noProof="0" dirty="0">
                 <a:ln>
                   <a:noFill/>
                 </a:ln>
@@ -3240,42 +3256,73 @@
               </a:rPr>
               <a:t>Minefield</a:t>
             </a:r>
-            <a:endParaRPr kumimoji="0" lang="en-US" sz="2200" b="0" i="0" u="none" strike="noStrike" kern="0" cap="none" spc="0" normalizeH="0" baseline="0" noProof="0" dirty="0">
-              <a:ln>
-                <a:noFill/>
-              </a:ln>
-              <a:solidFill>
-                <a:sysClr val="windowText" lastClr="000000"/>
-              </a:solidFill>
-              <a:effectLst/>
-              <a:uLnTx/>
-              <a:uFillTx/>
-              <a:latin typeface="Calibri" pitchFamily="34" charset="0"/>
-            </a:endParaRPr>
           </a:p>
         </p:txBody>
       </p:sp>
       <p:cxnSp>
         <p:nvCxnSpPr>
-          <p:cNvPr id="88" name="Elbow Connector 87"/>
+          <p:cNvPr id="5" name="Straight Connector 4">
+            <a:extLst>
+              <a:ext uri="{FF2B5EF4-FFF2-40B4-BE49-F238E27FC236}">
+                <a16:creationId xmlns:a16="http://schemas.microsoft.com/office/drawing/2014/main" id="{C1A0FEAB-AD0C-6EA5-94E8-479B96326D3D}"/>
+              </a:ext>
+            </a:extLst>
+          </p:cNvPr>
           <p:cNvCxnSpPr>
+            <a:cxnSpLocks/>
             <a:stCxn id="86" idx="3"/>
-            <a:endCxn id="87" idx="1"/>
           </p:cNvCxnSpPr>
           <p:nvPr/>
         </p:nvCxnSpPr>
         <p:spPr>
-          <a:xfrm flipV="1">
-            <a:off x="3585652" y="2636331"/>
-            <a:ext cx="1056497" cy="1"/>
+          <a:xfrm>
+            <a:off x="3585652" y="2636332"/>
+            <a:ext cx="1013802" cy="0"/>
           </a:xfrm>
-          <a:prstGeom prst="bentConnector3">
-            <a:avLst>
-              <a:gd name="adj1" fmla="val 50000"/>
-            </a:avLst>
+          <a:prstGeom prst="line">
+            <a:avLst/>
+          </a:prstGeom>
+          <a:ln w="28575"/>
+        </p:spPr>
+        <p:style>
+          <a:lnRef idx="1">
+            <a:schemeClr val="dk1"/>
+          </a:lnRef>
+          <a:fillRef idx="0">
+            <a:schemeClr val="dk1"/>
+          </a:fillRef>
+          <a:effectRef idx="0">
+            <a:schemeClr val="dk1"/>
+          </a:effectRef>
+          <a:fontRef idx="minor">
+            <a:schemeClr val="tx1"/>
+          </a:fontRef>
+        </p:style>
+      </p:cxnSp>
+      <p:cxnSp>
+        <p:nvCxnSpPr>
+          <p:cNvPr id="3" name="Straight Connector 2">
+            <a:extLst>
+              <a:ext uri="{FF2B5EF4-FFF2-40B4-BE49-F238E27FC236}">
+                <a16:creationId xmlns:a16="http://schemas.microsoft.com/office/drawing/2014/main" id="{ED70A36F-5C85-9E72-DD9D-130F09E218A1}"/>
+              </a:ext>
+            </a:extLst>
+          </p:cNvPr>
+          <p:cNvCxnSpPr>
+            <a:cxnSpLocks/>
+          </p:cNvCxnSpPr>
+          <p:nvPr/>
+        </p:nvCxnSpPr>
+        <p:spPr>
+          <a:xfrm>
+            <a:off x="4556760" y="2636330"/>
+            <a:ext cx="85389" cy="0"/>
+          </a:xfrm>
+          <a:prstGeom prst="line">
+            <a:avLst/>
           </a:prstGeom>
           <a:noFill/>
-          <a:ln w="28575" cap="flat" cmpd="sng" algn="ctr">
+          <a:ln w="28575" cap="rnd" cmpd="sng" algn="ctr">
             <a:solidFill>
               <a:srgbClr val="FF0000"/>
             </a:solidFill>
@@ -3285,6 +3332,418 @@
           </a:ln>
           <a:effectLst/>
         </p:spPr>
+      </p:cxnSp>
+      <p:sp>
+        <p:nvSpPr>
+          <p:cNvPr id="8" name="Rectangle 7">
+            <a:extLst>
+              <a:ext uri="{FF2B5EF4-FFF2-40B4-BE49-F238E27FC236}">
+                <a16:creationId xmlns:a16="http://schemas.microsoft.com/office/drawing/2014/main" id="{348E108D-5AAE-F8C7-9CDF-2C097197F876}"/>
+              </a:ext>
+            </a:extLst>
+          </p:cNvPr>
+          <p:cNvSpPr/>
+          <p:nvPr/>
+        </p:nvSpPr>
+        <p:spPr>
+          <a:xfrm>
+            <a:off x="2843808" y="3717613"/>
+            <a:ext cx="741844" cy="430887"/>
+          </a:xfrm>
+          <a:prstGeom prst="rect">
+            <a:avLst/>
+          </a:prstGeom>
+          <a:ln/>
+        </p:spPr>
+        <p:style>
+          <a:lnRef idx="1">
+            <a:schemeClr val="dk1"/>
+          </a:lnRef>
+          <a:fillRef idx="2">
+            <a:schemeClr val="dk1"/>
+          </a:fillRef>
+          <a:effectRef idx="1">
+            <a:schemeClr val="dk1"/>
+          </a:effectRef>
+          <a:fontRef idx="minor">
+            <a:schemeClr val="dk1"/>
+          </a:fontRef>
+        </p:style>
+        <p:txBody>
+          <a:bodyPr wrap="square" rtlCol="0" anchor="ctr">
+            <a:spAutoFit/>
+          </a:bodyPr>
+          <a:lstStyle/>
+          <a:p>
+            <a:pPr algn="ctr"/>
+            <a:r>
+              <a:rPr lang="en-US" sz="2200" kern="0">
+                <a:solidFill>
+                  <a:sysClr val="windowText" lastClr="000000"/>
+                </a:solidFill>
+                <a:latin typeface="Calibri" pitchFamily="34" charset="0"/>
+              </a:rPr>
+              <a:t>Foo</a:t>
+            </a:r>
+            <a:endParaRPr lang="en-US" sz="2200" kern="0" dirty="0">
+              <a:solidFill>
+                <a:sysClr val="windowText" lastClr="000000"/>
+              </a:solidFill>
+              <a:latin typeface="Calibri" pitchFamily="34" charset="0"/>
+            </a:endParaRPr>
+          </a:p>
+        </p:txBody>
+      </p:sp>
+      <p:sp>
+        <p:nvSpPr>
+          <p:cNvPr id="9" name="Rectangle 8">
+            <a:extLst>
+              <a:ext uri="{FF2B5EF4-FFF2-40B4-BE49-F238E27FC236}">
+                <a16:creationId xmlns:a16="http://schemas.microsoft.com/office/drawing/2014/main" id="{A73FD6D0-A0DF-A15C-6C2D-D49E8E02ADEB}"/>
+              </a:ext>
+            </a:extLst>
+          </p:cNvPr>
+          <p:cNvSpPr/>
+          <p:nvPr/>
+        </p:nvSpPr>
+        <p:spPr>
+          <a:xfrm>
+            <a:off x="4211960" y="3717613"/>
+            <a:ext cx="741844" cy="430887"/>
+          </a:xfrm>
+          <a:prstGeom prst="rect">
+            <a:avLst/>
+          </a:prstGeom>
+          <a:ln/>
+        </p:spPr>
+        <p:style>
+          <a:lnRef idx="1">
+            <a:schemeClr val="dk1"/>
+          </a:lnRef>
+          <a:fillRef idx="2">
+            <a:schemeClr val="dk1"/>
+          </a:fillRef>
+          <a:effectRef idx="1">
+            <a:schemeClr val="dk1"/>
+          </a:effectRef>
+          <a:fontRef idx="minor">
+            <a:schemeClr val="dk1"/>
+          </a:fontRef>
+        </p:style>
+        <p:txBody>
+          <a:bodyPr wrap="square" rtlCol="0" anchor="ctr">
+            <a:spAutoFit/>
+          </a:bodyPr>
+          <a:lstStyle/>
+          <a:p>
+            <a:pPr marL="0" marR="0" lvl="0" indent="0" algn="ctr" defTabSz="914400" eaLnBrk="1" fontAlgn="auto" latinLnBrk="0" hangingPunct="1">
+              <a:lnSpc>
+                <a:spcPct val="100000"/>
+              </a:lnSpc>
+              <a:spcBef>
+                <a:spcPts val="0"/>
+              </a:spcBef>
+              <a:spcAft>
+                <a:spcPts val="0"/>
+              </a:spcAft>
+              <a:buClrTx/>
+              <a:buSzTx/>
+              <a:buFontTx/>
+              <a:buNone/>
+              <a:tabLst/>
+              <a:defRPr/>
+            </a:pPr>
+            <a:r>
+              <a:rPr kumimoji="0" lang="en-US" sz="2200" i="0" u="none" strike="noStrike" kern="0" cap="none" spc="0" normalizeH="0" baseline="0" noProof="0" dirty="0">
+                <a:ln>
+                  <a:noFill/>
+                </a:ln>
+                <a:solidFill>
+                  <a:sysClr val="windowText" lastClr="000000"/>
+                </a:solidFill>
+                <a:effectLst/>
+                <a:uLnTx/>
+                <a:uFillTx/>
+                <a:latin typeface="Calibri" pitchFamily="34" charset="0"/>
+              </a:rPr>
+              <a:t>Bar</a:t>
+            </a:r>
+          </a:p>
+        </p:txBody>
+      </p:sp>
+      <p:cxnSp>
+        <p:nvCxnSpPr>
+          <p:cNvPr id="10" name="Straight Connector 9">
+            <a:extLst>
+              <a:ext uri="{FF2B5EF4-FFF2-40B4-BE49-F238E27FC236}">
+                <a16:creationId xmlns:a16="http://schemas.microsoft.com/office/drawing/2014/main" id="{F69169CF-7C49-CD0D-883C-DBB997C3685F}"/>
+              </a:ext>
+            </a:extLst>
+          </p:cNvPr>
+          <p:cNvCxnSpPr>
+            <a:cxnSpLocks/>
+          </p:cNvCxnSpPr>
+          <p:nvPr/>
+        </p:nvCxnSpPr>
+        <p:spPr>
+          <a:xfrm>
+            <a:off x="3585652" y="3933056"/>
+            <a:ext cx="626308" cy="0"/>
+          </a:xfrm>
+          <a:prstGeom prst="line">
+            <a:avLst/>
+          </a:prstGeom>
+          <a:ln w="28575">
+            <a:solidFill>
+              <a:srgbClr val="0070C0"/>
+            </a:solidFill>
+            <a:headEnd type="none" w="med" len="med"/>
+            <a:tailEnd type="none" w="med" len="med"/>
+          </a:ln>
+        </p:spPr>
+        <p:style>
+          <a:lnRef idx="1">
+            <a:schemeClr val="dk1"/>
+          </a:lnRef>
+          <a:fillRef idx="0">
+            <a:schemeClr val="dk1"/>
+          </a:fillRef>
+          <a:effectRef idx="0">
+            <a:schemeClr val="dk1"/>
+          </a:effectRef>
+          <a:fontRef idx="minor">
+            <a:schemeClr val="tx1"/>
+          </a:fontRef>
+        </p:style>
+      </p:cxnSp>
+      <p:sp>
+        <p:nvSpPr>
+          <p:cNvPr id="13" name="Rectangle 12">
+            <a:extLst>
+              <a:ext uri="{FF2B5EF4-FFF2-40B4-BE49-F238E27FC236}">
+                <a16:creationId xmlns:a16="http://schemas.microsoft.com/office/drawing/2014/main" id="{7EB8088E-0AC6-AAB3-01BC-E455817FD2E0}"/>
+              </a:ext>
+            </a:extLst>
+          </p:cNvPr>
+          <p:cNvSpPr/>
+          <p:nvPr/>
+        </p:nvSpPr>
+        <p:spPr>
+          <a:xfrm>
+            <a:off x="6300192" y="3717613"/>
+            <a:ext cx="741844" cy="430887"/>
+          </a:xfrm>
+          <a:prstGeom prst="rect">
+            <a:avLst/>
+          </a:prstGeom>
+          <a:ln/>
+        </p:spPr>
+        <p:style>
+          <a:lnRef idx="1">
+            <a:schemeClr val="dk1"/>
+          </a:lnRef>
+          <a:fillRef idx="2">
+            <a:schemeClr val="dk1"/>
+          </a:fillRef>
+          <a:effectRef idx="1">
+            <a:schemeClr val="dk1"/>
+          </a:effectRef>
+          <a:fontRef idx="minor">
+            <a:schemeClr val="dk1"/>
+          </a:fontRef>
+        </p:style>
+        <p:txBody>
+          <a:bodyPr wrap="square" rtlCol="0" anchor="ctr">
+            <a:spAutoFit/>
+          </a:bodyPr>
+          <a:lstStyle/>
+          <a:p>
+            <a:pPr algn="ctr"/>
+            <a:r>
+              <a:rPr lang="en-US" sz="2200" kern="0">
+                <a:solidFill>
+                  <a:sysClr val="windowText" lastClr="000000"/>
+                </a:solidFill>
+                <a:latin typeface="Calibri" pitchFamily="34" charset="0"/>
+              </a:rPr>
+              <a:t>Foo</a:t>
+            </a:r>
+            <a:endParaRPr lang="en-US" sz="2200" kern="0" dirty="0">
+              <a:solidFill>
+                <a:sysClr val="windowText" lastClr="000000"/>
+              </a:solidFill>
+              <a:latin typeface="Calibri" pitchFamily="34" charset="0"/>
+            </a:endParaRPr>
+          </a:p>
+        </p:txBody>
+      </p:sp>
+      <p:sp>
+        <p:nvSpPr>
+          <p:cNvPr id="14" name="Rectangle 13">
+            <a:extLst>
+              <a:ext uri="{FF2B5EF4-FFF2-40B4-BE49-F238E27FC236}">
+                <a16:creationId xmlns:a16="http://schemas.microsoft.com/office/drawing/2014/main" id="{2FCD4CFD-78E5-4318-77A6-A531E8347D06}"/>
+              </a:ext>
+            </a:extLst>
+          </p:cNvPr>
+          <p:cNvSpPr/>
+          <p:nvPr/>
+        </p:nvSpPr>
+        <p:spPr>
+          <a:xfrm>
+            <a:off x="7668344" y="3717613"/>
+            <a:ext cx="741844" cy="430887"/>
+          </a:xfrm>
+          <a:prstGeom prst="rect">
+            <a:avLst/>
+          </a:prstGeom>
+          <a:ln/>
+        </p:spPr>
+        <p:style>
+          <a:lnRef idx="1">
+            <a:schemeClr val="dk1"/>
+          </a:lnRef>
+          <a:fillRef idx="2">
+            <a:schemeClr val="dk1"/>
+          </a:fillRef>
+          <a:effectRef idx="1">
+            <a:schemeClr val="dk1"/>
+          </a:effectRef>
+          <a:fontRef idx="minor">
+            <a:schemeClr val="dk1"/>
+          </a:fontRef>
+        </p:style>
+        <p:txBody>
+          <a:bodyPr wrap="square" rtlCol="0" anchor="ctr">
+            <a:spAutoFit/>
+          </a:bodyPr>
+          <a:lstStyle/>
+          <a:p>
+            <a:pPr marL="0" marR="0" lvl="0" indent="0" algn="ctr" defTabSz="914400" eaLnBrk="1" fontAlgn="auto" latinLnBrk="0" hangingPunct="1">
+              <a:lnSpc>
+                <a:spcPct val="100000"/>
+              </a:lnSpc>
+              <a:spcBef>
+                <a:spcPts val="0"/>
+              </a:spcBef>
+              <a:spcAft>
+                <a:spcPts val="0"/>
+              </a:spcAft>
+              <a:buClrTx/>
+              <a:buSzTx/>
+              <a:buFontTx/>
+              <a:buNone/>
+              <a:tabLst/>
+              <a:defRPr/>
+            </a:pPr>
+            <a:r>
+              <a:rPr kumimoji="0" lang="en-US" sz="2200" i="0" u="none" strike="noStrike" kern="0" cap="none" spc="0" normalizeH="0" baseline="0" noProof="0" dirty="0">
+                <a:ln>
+                  <a:noFill/>
+                </a:ln>
+                <a:solidFill>
+                  <a:sysClr val="windowText" lastClr="000000"/>
+                </a:solidFill>
+                <a:effectLst/>
+                <a:uLnTx/>
+                <a:uFillTx/>
+                <a:latin typeface="Calibri" pitchFamily="34" charset="0"/>
+              </a:rPr>
+              <a:t>Bar</a:t>
+            </a:r>
+          </a:p>
+        </p:txBody>
+      </p:sp>
+      <p:cxnSp>
+        <p:nvCxnSpPr>
+          <p:cNvPr id="15" name="Straight Connector 14">
+            <a:extLst>
+              <a:ext uri="{FF2B5EF4-FFF2-40B4-BE49-F238E27FC236}">
+                <a16:creationId xmlns:a16="http://schemas.microsoft.com/office/drawing/2014/main" id="{B88A7405-05C5-4557-FDA3-6E2050DE7726}"/>
+              </a:ext>
+            </a:extLst>
+          </p:cNvPr>
+          <p:cNvCxnSpPr>
+            <a:cxnSpLocks/>
+          </p:cNvCxnSpPr>
+          <p:nvPr/>
+        </p:nvCxnSpPr>
+        <p:spPr>
+          <a:xfrm>
+            <a:off x="7042036" y="3933056"/>
+            <a:ext cx="626308" cy="0"/>
+          </a:xfrm>
+          <a:prstGeom prst="line">
+            <a:avLst/>
+          </a:prstGeom>
+          <a:ln w="28575">
+            <a:solidFill>
+              <a:srgbClr val="0070C0"/>
+            </a:solidFill>
+            <a:headEnd type="none" w="med" len="med"/>
+            <a:tailEnd type="arrow" w="med" len="med"/>
+          </a:ln>
+        </p:spPr>
+        <p:style>
+          <a:lnRef idx="1">
+            <a:schemeClr val="dk1"/>
+          </a:lnRef>
+          <a:fillRef idx="0">
+            <a:schemeClr val="dk1"/>
+          </a:fillRef>
+          <a:effectRef idx="0">
+            <a:schemeClr val="dk1"/>
+          </a:effectRef>
+          <a:fontRef idx="minor">
+            <a:schemeClr val="tx1"/>
+          </a:fontRef>
+        </p:style>
+      </p:cxnSp>
+      <p:cxnSp>
+        <p:nvCxnSpPr>
+          <p:cNvPr id="21" name="Straight Connector 20">
+            <a:extLst>
+              <a:ext uri="{FF2B5EF4-FFF2-40B4-BE49-F238E27FC236}">
+                <a16:creationId xmlns:a16="http://schemas.microsoft.com/office/drawing/2014/main" id="{CA95FA64-95EA-CA22-DC3D-A939654A8679}"/>
+              </a:ext>
+            </a:extLst>
+          </p:cNvPr>
+          <p:cNvCxnSpPr>
+            <a:cxnSpLocks/>
+          </p:cNvCxnSpPr>
+          <p:nvPr/>
+        </p:nvCxnSpPr>
+        <p:spPr>
+          <a:xfrm>
+            <a:off x="5580112" y="3573016"/>
+            <a:ext cx="0" cy="720080"/>
+          </a:xfrm>
+          <a:prstGeom prst="line">
+            <a:avLst/>
+          </a:prstGeom>
+          <a:ln w="19050">
+            <a:solidFill>
+              <a:schemeClr val="bg1">
+                <a:lumMod val="65000"/>
+              </a:schemeClr>
+            </a:solidFill>
+            <a:prstDash val="sysDash"/>
+          </a:ln>
+        </p:spPr>
+        <p:style>
+          <a:lnRef idx="1">
+            <a:schemeClr val="accent1"/>
+          </a:lnRef>
+          <a:fillRef idx="0">
+            <a:schemeClr val="accent1"/>
+          </a:fillRef>
+          <a:effectRef idx="0">
+            <a:schemeClr val="accent1"/>
+          </a:effectRef>
+          <a:fontRef idx="minor">
+            <a:schemeClr val="tx1"/>
+          </a:fontRef>
+        </p:style>
       </p:cxnSp>
     </p:spTree>
     <p:extLst>
@@ -3296,13 +3755,6 @@
   <p:clrMapOvr>
     <a:masterClrMapping/>
   </p:clrMapOvr>
-  <p:timing>
-    <p:tnLst>
-      <p:par>
-        <p:cTn id="1" dur="indefinite" restart="never" nodeType="tmRoot"/>
-      </p:par>
-    </p:tnLst>
-  </p:timing>
 </p:sld>
 </file>
 

</xml_diff>